<commit_message>
Upadating Deck Ver 3
</commit_message>
<xml_diff>
--- a/presentation/predixPresentation_jesaldan_JimDelforge_BrianHenzelmann.pptx
+++ b/presentation/predixPresentation_jesaldan_JimDelforge_BrianHenzelmann.pptx
@@ -8293,8 +8293,8 @@
         </p:nvSpPr>
         <p:spPr bwMode="gray">
           <a:xfrm>
-            <a:off x="8276543" y="4487318"/>
-            <a:ext cx="595085" cy="276999"/>
+            <a:off x="8229431" y="4487318"/>
+            <a:ext cx="689311" cy="276999"/>
           </a:xfrm>
           <a:prstGeom prst="rect">
             <a:avLst/>
@@ -8433,7 +8433,7 @@
                 <a:cs typeface="Arial"/>
                 <a:sym typeface="Wingdings" pitchFamily="2" charset="2"/>
               </a:rPr>
-              <a:t>FW34</a:t>
+              <a:t>May 18</a:t>
             </a:r>
             <a:endParaRPr lang="en-US" sz="1200" dirty="0">
               <a:latin typeface="Arial"/>
@@ -9128,8 +9128,8 @@
         </p:nvSpPr>
         <p:spPr bwMode="gray">
           <a:xfrm>
-            <a:off x="8255164" y="3295398"/>
-            <a:ext cx="637840" cy="276999"/>
+            <a:off x="8229430" y="3295398"/>
+            <a:ext cx="689311" cy="276999"/>
           </a:xfrm>
           <a:prstGeom prst="rect">
             <a:avLst/>
@@ -9268,7 +9268,7 @@
                 <a:cs typeface="Arial"/>
                 <a:sym typeface="Wingdings" pitchFamily="2" charset="2"/>
               </a:rPr>
-              <a:t>FW 33</a:t>
+              <a:t>May 15</a:t>
             </a:r>
             <a:endParaRPr lang="en-US" sz="1200" dirty="0">
               <a:latin typeface="Arial"/>
@@ -10780,8 +10780,8 @@
         </p:nvSpPr>
         <p:spPr bwMode="gray">
           <a:xfrm>
-            <a:off x="8255164" y="5083278"/>
-            <a:ext cx="637840" cy="276999"/>
+            <a:off x="8229430" y="5083278"/>
+            <a:ext cx="689311" cy="276999"/>
           </a:xfrm>
           <a:prstGeom prst="rect">
             <a:avLst/>
@@ -10920,7 +10920,7 @@
                 <a:cs typeface="Arial"/>
                 <a:sym typeface="Wingdings" pitchFamily="2" charset="2"/>
               </a:rPr>
-              <a:t>FW 34</a:t>
+              <a:t>May 24</a:t>
             </a:r>
             <a:endParaRPr lang="en-US" sz="1200" dirty="0">
               <a:latin typeface="Arial"/>
@@ -11624,8 +11624,8 @@
         </p:nvSpPr>
         <p:spPr bwMode="gray">
           <a:xfrm>
-            <a:off x="8255164" y="3891358"/>
-            <a:ext cx="637840" cy="276999"/>
+            <a:off x="8229430" y="3891358"/>
+            <a:ext cx="689311" cy="276999"/>
           </a:xfrm>
           <a:prstGeom prst="rect">
             <a:avLst/>
@@ -11764,7 +11764,7 @@
                 <a:cs typeface="Arial"/>
                 <a:sym typeface="Wingdings" pitchFamily="2" charset="2"/>
               </a:rPr>
-              <a:t>FW 34</a:t>
+              <a:t>May 18</a:t>
             </a:r>
             <a:endParaRPr lang="en-US" sz="1200" dirty="0">
               <a:latin typeface="Arial"/>
@@ -12480,8 +12480,8 @@
         </p:nvSpPr>
         <p:spPr bwMode="gray">
           <a:xfrm>
-            <a:off x="8255164" y="5679237"/>
-            <a:ext cx="637840" cy="276999"/>
+            <a:off x="7989930" y="5679237"/>
+            <a:ext cx="911728" cy="276999"/>
           </a:xfrm>
           <a:prstGeom prst="rect">
             <a:avLst/>
@@ -12620,7 +12620,7 @@
                 <a:cs typeface="Arial"/>
                 <a:sym typeface="Wingdings" pitchFamily="2" charset="2"/>
               </a:rPr>
-              <a:t>FW 35</a:t>
+              <a:t>May 26-28</a:t>
             </a:r>
             <a:endParaRPr lang="en-US" sz="1200" dirty="0">
               <a:latin typeface="Arial"/>

</xml_diff>